<commit_message>
Update session 19 documents and add session 19 documents.
</commit_message>
<xml_diff>
--- a/CPSC-24700/Presentations/session-19.pptx
+++ b/CPSC-24700/Presentations/session-19.pptx
@@ -5,15 +5,17 @@
     <p:sldMasterId id="2147483648" r:id="rId1"/>
   </p:sldMasterIdLst>
   <p:notesMasterIdLst>
-    <p:notesMasterId r:id="rId8"/>
+    <p:notesMasterId r:id="rId10"/>
   </p:notesMasterIdLst>
   <p:sldIdLst>
     <p:sldId id="257" r:id="rId2"/>
     <p:sldId id="291" r:id="rId3"/>
-    <p:sldId id="300" r:id="rId4"/>
-    <p:sldId id="301" r:id="rId5"/>
-    <p:sldId id="299" r:id="rId6"/>
-    <p:sldId id="263" r:id="rId7"/>
+    <p:sldId id="302" r:id="rId4"/>
+    <p:sldId id="304" r:id="rId5"/>
+    <p:sldId id="300" r:id="rId6"/>
+    <p:sldId id="301" r:id="rId7"/>
+    <p:sldId id="299" r:id="rId8"/>
+    <p:sldId id="263" r:id="rId9"/>
   </p:sldIdLst>
   <p:sldSz cx="12192000" cy="6858000"/>
   <p:notesSz cx="7315200" cy="9601200"/>
@@ -120,6 +122,10 @@
 </p:presentation>
 </file>
 
+<file path=ppt/revisionInfo.xml><?xml version="1.0" encoding="utf-8"?>
+<p1510:revInfo xmlns:a="http://schemas.openxmlformats.org/drawingml/2006/main" xmlns:r="http://schemas.openxmlformats.org/officeDocument/2006/relationships" xmlns:p1510="http://schemas.microsoft.com/office/powerpoint/2015/10/main"/>
+</file>
+
 <file path=ppt/notesMasters/notesMaster1.xml><?xml version="1.0" encoding="utf-8"?>
 <p:notesMaster xmlns:a="http://schemas.openxmlformats.org/drawingml/2006/main" xmlns:r="http://schemas.openxmlformats.org/officeDocument/2006/relationships" xmlns:p="http://schemas.openxmlformats.org/presentationml/2006/main">
   <p:cSld>
@@ -202,7 +208,7 @@
           <a:p>
             <a:fld id="{1CF91C02-A59E-4778-8D4F-4840DBBEFA68}" type="datetimeFigureOut">
               <a:rPr lang="en-US" smtClean="0"/>
-              <a:t>10/12/2017</a:t>
+              <a:t>10/13/2017</a:t>
             </a:fld>
             <a:endParaRPr lang="en-US"/>
           </a:p>
@@ -719,7 +725,7 @@
     </p:spTree>
     <p:extLst>
       <p:ext uri="{BB962C8B-B14F-4D97-AF65-F5344CB8AC3E}">
-        <p14:creationId xmlns:p14="http://schemas.microsoft.com/office/powerpoint/2010/main" val="1150630978"/>
+        <p14:creationId xmlns:p14="http://schemas.microsoft.com/office/powerpoint/2010/main" val="1522113511"/>
       </p:ext>
     </p:extLst>
   </p:cSld>
@@ -773,7 +779,10 @@
           <a:bodyPr/>
           <a:lstStyle/>
           <a:p>
-            <a:endParaRPr lang="en-US" sz="1000" dirty="0"/>
+            <a:r>
+              <a:rPr lang="en-US" sz="1000" dirty="0"/>
+              <a:t>Open answer sheet and do a quick review… stop sharing desktop so that it does not record</a:t>
+            </a:r>
           </a:p>
         </p:txBody>
       </p:sp>
@@ -803,7 +812,7 @@
     </p:spTree>
     <p:extLst>
       <p:ext uri="{BB962C8B-B14F-4D97-AF65-F5344CB8AC3E}">
-        <p14:creationId xmlns:p14="http://schemas.microsoft.com/office/powerpoint/2010/main" val="1809836636"/>
+        <p14:creationId xmlns:p14="http://schemas.microsoft.com/office/powerpoint/2010/main" val="82201764"/>
       </p:ext>
     </p:extLst>
   </p:cSld>
@@ -857,15 +866,7 @@
           <a:bodyPr/>
           <a:lstStyle/>
           <a:p>
-            <a:r>
-              <a:rPr lang="en-US" dirty="0"/>
-              <a:t>I have made the solution to our Week 3 lab available. My strong suggestion is to do you best on your own and using “normal” resources available to you (Web, classmates, etc.) and then use the solution as a last resort</a:t>
-            </a:r>
-            <a:r>
-              <a:rPr lang="en-US"/>
-              <a:t>. </a:t>
-            </a:r>
-            <a:endParaRPr lang="en-US" dirty="0"/>
+            <a:endParaRPr lang="en-US" sz="1000" dirty="0"/>
           </a:p>
         </p:txBody>
       </p:sp>
@@ -895,7 +896,7 @@
     </p:spTree>
     <p:extLst>
       <p:ext uri="{BB962C8B-B14F-4D97-AF65-F5344CB8AC3E}">
-        <p14:creationId xmlns:p14="http://schemas.microsoft.com/office/powerpoint/2010/main" val="2032946705"/>
+        <p14:creationId xmlns:p14="http://schemas.microsoft.com/office/powerpoint/2010/main" val="1150630978"/>
       </p:ext>
     </p:extLst>
   </p:cSld>
@@ -949,6 +950,98 @@
           <a:bodyPr/>
           <a:lstStyle/>
           <a:p>
+            <a:endParaRPr lang="en-US" sz="1000" dirty="0"/>
+          </a:p>
+        </p:txBody>
+      </p:sp>
+      <p:sp>
+        <p:nvSpPr>
+          <p:cNvPr id="4" name="Slide Number Placeholder 3"/>
+          <p:cNvSpPr>
+            <a:spLocks noGrp="1"/>
+          </p:cNvSpPr>
+          <p:nvPr>
+            <p:ph type="sldNum" sz="quarter" idx="10"/>
+          </p:nvPr>
+        </p:nvSpPr>
+        <p:spPr/>
+        <p:txBody>
+          <a:bodyPr/>
+          <a:lstStyle/>
+          <a:p>
+            <a:fld id="{23B99BB9-C7F6-43B3-A122-46088ABB36FB}" type="slidenum">
+              <a:rPr lang="en-US" smtClean="0"/>
+              <a:t>6</a:t>
+            </a:fld>
+            <a:endParaRPr lang="en-US"/>
+          </a:p>
+        </p:txBody>
+      </p:sp>
+    </p:spTree>
+    <p:extLst>
+      <p:ext uri="{BB962C8B-B14F-4D97-AF65-F5344CB8AC3E}">
+        <p14:creationId xmlns:p14="http://schemas.microsoft.com/office/powerpoint/2010/main" val="1809836636"/>
+      </p:ext>
+    </p:extLst>
+  </p:cSld>
+  <p:clrMapOvr>
+    <a:masterClrMapping/>
+  </p:clrMapOvr>
+</p:notes>
+</file>
+
+<file path=ppt/notesSlides/notesSlide7.xml><?xml version="1.0" encoding="utf-8"?>
+<p:notes xmlns:a="http://schemas.openxmlformats.org/drawingml/2006/main" xmlns:r="http://schemas.openxmlformats.org/officeDocument/2006/relationships" xmlns:p="http://schemas.openxmlformats.org/presentationml/2006/main">
+  <p:cSld>
+    <p:spTree>
+      <p:nvGrpSpPr>
+        <p:cNvPr id="1" name=""/>
+        <p:cNvGrpSpPr/>
+        <p:nvPr/>
+      </p:nvGrpSpPr>
+      <p:grpSpPr>
+        <a:xfrm>
+          <a:off x="0" y="0"/>
+          <a:ext cx="0" cy="0"/>
+          <a:chOff x="0" y="0"/>
+          <a:chExt cx="0" cy="0"/>
+        </a:xfrm>
+      </p:grpSpPr>
+      <p:sp>
+        <p:nvSpPr>
+          <p:cNvPr id="2" name="Slide Image Placeholder 1"/>
+          <p:cNvSpPr>
+            <a:spLocks noGrp="1" noRot="1" noChangeAspect="1"/>
+          </p:cNvSpPr>
+          <p:nvPr>
+            <p:ph type="sldImg"/>
+          </p:nvPr>
+        </p:nvSpPr>
+        <p:spPr/>
+      </p:sp>
+      <p:sp>
+        <p:nvSpPr>
+          <p:cNvPr id="3" name="Notes Placeholder 2"/>
+          <p:cNvSpPr>
+            <a:spLocks noGrp="1"/>
+          </p:cNvSpPr>
+          <p:nvPr>
+            <p:ph type="body" idx="1"/>
+          </p:nvPr>
+        </p:nvSpPr>
+        <p:spPr/>
+        <p:txBody>
+          <a:bodyPr/>
+          <a:lstStyle/>
+          <a:p>
+            <a:r>
+              <a:rPr lang="en-US" dirty="0"/>
+              <a:t>I have made the solution to our Week 3 lab available. My strong suggestion is to do you best on your own and using “normal” resources available to you (Web, classmates, etc.) and then use the solution as a last resort</a:t>
+            </a:r>
+            <a:r>
+              <a:rPr lang="en-US"/>
+              <a:t>. </a:t>
+            </a:r>
             <a:endParaRPr lang="en-US" dirty="0"/>
           </a:p>
         </p:txBody>
@@ -970,7 +1063,91 @@
           <a:p>
             <a:fld id="{5394DE12-7B9B-46AA-AC19-C30A49928B9B}" type="slidenum">
               <a:rPr lang="en-US" smtClean="0"/>
-              <a:t>6</a:t>
+              <a:t>7</a:t>
+            </a:fld>
+            <a:endParaRPr lang="en-US" dirty="0"/>
+          </a:p>
+        </p:txBody>
+      </p:sp>
+    </p:spTree>
+    <p:extLst>
+      <p:ext uri="{BB962C8B-B14F-4D97-AF65-F5344CB8AC3E}">
+        <p14:creationId xmlns:p14="http://schemas.microsoft.com/office/powerpoint/2010/main" val="2032946705"/>
+      </p:ext>
+    </p:extLst>
+  </p:cSld>
+  <p:clrMapOvr>
+    <a:masterClrMapping/>
+  </p:clrMapOvr>
+</p:notes>
+</file>
+
+<file path=ppt/notesSlides/notesSlide8.xml><?xml version="1.0" encoding="utf-8"?>
+<p:notes xmlns:a="http://schemas.openxmlformats.org/drawingml/2006/main" xmlns:r="http://schemas.openxmlformats.org/officeDocument/2006/relationships" xmlns:p="http://schemas.openxmlformats.org/presentationml/2006/main">
+  <p:cSld>
+    <p:spTree>
+      <p:nvGrpSpPr>
+        <p:cNvPr id="1" name=""/>
+        <p:cNvGrpSpPr/>
+        <p:nvPr/>
+      </p:nvGrpSpPr>
+      <p:grpSpPr>
+        <a:xfrm>
+          <a:off x="0" y="0"/>
+          <a:ext cx="0" cy="0"/>
+          <a:chOff x="0" y="0"/>
+          <a:chExt cx="0" cy="0"/>
+        </a:xfrm>
+      </p:grpSpPr>
+      <p:sp>
+        <p:nvSpPr>
+          <p:cNvPr id="2" name="Slide Image Placeholder 1"/>
+          <p:cNvSpPr>
+            <a:spLocks noGrp="1" noRot="1" noChangeAspect="1"/>
+          </p:cNvSpPr>
+          <p:nvPr>
+            <p:ph type="sldImg"/>
+          </p:nvPr>
+        </p:nvSpPr>
+        <p:spPr/>
+      </p:sp>
+      <p:sp>
+        <p:nvSpPr>
+          <p:cNvPr id="3" name="Notes Placeholder 2"/>
+          <p:cNvSpPr>
+            <a:spLocks noGrp="1"/>
+          </p:cNvSpPr>
+          <p:nvPr>
+            <p:ph type="body" idx="1"/>
+          </p:nvPr>
+        </p:nvSpPr>
+        <p:spPr/>
+        <p:txBody>
+          <a:bodyPr/>
+          <a:lstStyle/>
+          <a:p>
+            <a:endParaRPr lang="en-US" dirty="0"/>
+          </a:p>
+        </p:txBody>
+      </p:sp>
+      <p:sp>
+        <p:nvSpPr>
+          <p:cNvPr id="4" name="Slide Number Placeholder 3"/>
+          <p:cNvSpPr>
+            <a:spLocks noGrp="1"/>
+          </p:cNvSpPr>
+          <p:nvPr>
+            <p:ph type="sldNum" sz="quarter" idx="10"/>
+          </p:nvPr>
+        </p:nvSpPr>
+        <p:spPr/>
+        <p:txBody>
+          <a:bodyPr/>
+          <a:lstStyle/>
+          <a:p>
+            <a:fld id="{5394DE12-7B9B-46AA-AC19-C30A49928B9B}" type="slidenum">
+              <a:rPr lang="en-US" smtClean="0"/>
+              <a:t>8</a:t>
             </a:fld>
             <a:endParaRPr lang="en-US" dirty="0"/>
           </a:p>
@@ -1136,7 +1313,7 @@
           <a:p>
             <a:fld id="{5FB62F81-FD80-4AA8-93CA-E835B40BE667}" type="datetimeFigureOut">
               <a:rPr lang="en-US" smtClean="0"/>
-              <a:t>10/12/2017</a:t>
+              <a:t>10/13/2017</a:t>
             </a:fld>
             <a:endParaRPr lang="en-US"/>
           </a:p>
@@ -1334,7 +1511,7 @@
           <a:p>
             <a:fld id="{5FB62F81-FD80-4AA8-93CA-E835B40BE667}" type="datetimeFigureOut">
               <a:rPr lang="en-US" smtClean="0"/>
-              <a:t>10/12/2017</a:t>
+              <a:t>10/13/2017</a:t>
             </a:fld>
             <a:endParaRPr lang="en-US"/>
           </a:p>
@@ -1542,7 +1719,7 @@
           <a:p>
             <a:fld id="{5FB62F81-FD80-4AA8-93CA-E835B40BE667}" type="datetimeFigureOut">
               <a:rPr lang="en-US" smtClean="0"/>
-              <a:t>10/12/2017</a:t>
+              <a:t>10/13/2017</a:t>
             </a:fld>
             <a:endParaRPr lang="en-US"/>
           </a:p>
@@ -1740,7 +1917,7 @@
           <a:p>
             <a:fld id="{5FB62F81-FD80-4AA8-93CA-E835B40BE667}" type="datetimeFigureOut">
               <a:rPr lang="en-US" smtClean="0"/>
-              <a:t>10/12/2017</a:t>
+              <a:t>10/13/2017</a:t>
             </a:fld>
             <a:endParaRPr lang="en-US"/>
           </a:p>
@@ -2015,7 +2192,7 @@
           <a:p>
             <a:fld id="{5FB62F81-FD80-4AA8-93CA-E835B40BE667}" type="datetimeFigureOut">
               <a:rPr lang="en-US" smtClean="0"/>
-              <a:t>10/12/2017</a:t>
+              <a:t>10/13/2017</a:t>
             </a:fld>
             <a:endParaRPr lang="en-US"/>
           </a:p>
@@ -2280,7 +2457,7 @@
           <a:p>
             <a:fld id="{5FB62F81-FD80-4AA8-93CA-E835B40BE667}" type="datetimeFigureOut">
               <a:rPr lang="en-US" smtClean="0"/>
-              <a:t>10/12/2017</a:t>
+              <a:t>10/13/2017</a:t>
             </a:fld>
             <a:endParaRPr lang="en-US"/>
           </a:p>
@@ -2692,7 +2869,7 @@
           <a:p>
             <a:fld id="{5FB62F81-FD80-4AA8-93CA-E835B40BE667}" type="datetimeFigureOut">
               <a:rPr lang="en-US" smtClean="0"/>
-              <a:t>10/12/2017</a:t>
+              <a:t>10/13/2017</a:t>
             </a:fld>
             <a:endParaRPr lang="en-US"/>
           </a:p>
@@ -2833,7 +3010,7 @@
           <a:p>
             <a:fld id="{5FB62F81-FD80-4AA8-93CA-E835B40BE667}" type="datetimeFigureOut">
               <a:rPr lang="en-US" smtClean="0"/>
-              <a:t>10/12/2017</a:t>
+              <a:t>10/13/2017</a:t>
             </a:fld>
             <a:endParaRPr lang="en-US"/>
           </a:p>
@@ -2946,7 +3123,7 @@
           <a:p>
             <a:fld id="{5FB62F81-FD80-4AA8-93CA-E835B40BE667}" type="datetimeFigureOut">
               <a:rPr lang="en-US" smtClean="0"/>
-              <a:t>10/12/2017</a:t>
+              <a:t>10/13/2017</a:t>
             </a:fld>
             <a:endParaRPr lang="en-US"/>
           </a:p>
@@ -3257,7 +3434,7 @@
           <a:p>
             <a:fld id="{5FB62F81-FD80-4AA8-93CA-E835B40BE667}" type="datetimeFigureOut">
               <a:rPr lang="en-US" smtClean="0"/>
-              <a:t>10/12/2017</a:t>
+              <a:t>10/13/2017</a:t>
             </a:fld>
             <a:endParaRPr lang="en-US"/>
           </a:p>
@@ -3545,7 +3722,7 @@
           <a:p>
             <a:fld id="{5FB62F81-FD80-4AA8-93CA-E835B40BE667}" type="datetimeFigureOut">
               <a:rPr lang="en-US" smtClean="0"/>
-              <a:t>10/12/2017</a:t>
+              <a:t>10/13/2017</a:t>
             </a:fld>
             <a:endParaRPr lang="en-US"/>
           </a:p>
@@ -3786,7 +3963,7 @@
           <a:p>
             <a:fld id="{5FB62F81-FD80-4AA8-93CA-E835B40BE667}" type="datetimeFigureOut">
               <a:rPr lang="en-US" smtClean="0"/>
-              <a:t>10/12/2017</a:t>
+              <a:t>10/13/2017</a:t>
             </a:fld>
             <a:endParaRPr lang="en-US"/>
           </a:p>
@@ -4330,7 +4507,15 @@
             </a:pPr>
             <a:r>
               <a:rPr lang="en-US" sz="2000" dirty="0"/>
-              <a:t>Week 7 Lab &amp; Project 3: Google Maps!</a:t>
+              <a:t>If </a:t>
+            </a:r>
+            <a:r>
+              <a:rPr lang="en-US" sz="2000"/>
+              <a:t>time allows… Week </a:t>
+            </a:r>
+            <a:r>
+              <a:rPr lang="en-US" sz="2000" dirty="0"/>
+              <a:t>7 Lab &amp; Project 3: Google Maps!</a:t>
             </a:r>
           </a:p>
           <a:p>
@@ -4594,14 +4779,7 @@
           <a:p>
             <a:r>
               <a:rPr lang="en-US" sz="4800" dirty="0"/>
-              <a:t>Dynamic Documents </a:t>
-            </a:r>
-            <a:br>
-              <a:rPr lang="en-US" sz="4800" dirty="0"/>
-            </a:br>
-            <a:r>
-              <a:rPr lang="en-US" sz="4800" dirty="0"/>
-              <a:t>with JavaScript</a:t>
+              <a:t>Quiz 3 Review</a:t>
             </a:r>
           </a:p>
         </p:txBody>
@@ -4609,7 +4787,7 @@
     </p:spTree>
     <p:extLst>
       <p:ext uri="{BB962C8B-B14F-4D97-AF65-F5344CB8AC3E}">
-        <p14:creationId xmlns:p14="http://schemas.microsoft.com/office/powerpoint/2010/main" val="3613086193"/>
+        <p14:creationId xmlns:p14="http://schemas.microsoft.com/office/powerpoint/2010/main" val="3072991152"/>
       </p:ext>
     </p:extLst>
   </p:cSld>
@@ -4666,7 +4844,7 @@
           <a:p>
             <a:r>
               <a:rPr lang="en-US" sz="3600" dirty="0"/>
-              <a:t>Todays Assignment</a:t>
+              <a:t>Quiz 3 Review</a:t>
             </a:r>
           </a:p>
         </p:txBody>
@@ -4689,8 +4867,8 @@
         </p:nvSpPr>
         <p:spPr>
           <a:xfrm>
-            <a:off x="838198" y="1525772"/>
-            <a:ext cx="10515601" cy="4651191"/>
+            <a:off x="838198" y="1525773"/>
+            <a:ext cx="10515601" cy="596418"/>
           </a:xfrm>
         </p:spPr>
         <p:txBody>
@@ -4707,34 +4885,46 @@
             </a:pPr>
             <a:r>
               <a:rPr lang="en-US" sz="2000" u="sng" dirty="0"/>
-              <a:t>Assignment (before next class):</a:t>
+              <a:t>Most Missed Questions:</a:t>
             </a:r>
             <a:endParaRPr lang="en-US" sz="2000" dirty="0"/>
           </a:p>
-          <a:p>
-            <a:r>
-              <a:rPr lang="en-US" sz="2000" dirty="0"/>
-              <a:t>Study for Midterm Exam 1 which will be Monday</a:t>
-            </a:r>
-          </a:p>
-          <a:p>
-            <a:r>
-              <a:rPr lang="en-US" sz="2000" dirty="0"/>
-              <a:t>Work on Project 3 due at the end of next week</a:t>
-            </a:r>
-          </a:p>
-          <a:p>
-            <a:r>
-              <a:rPr lang="en-US" sz="2000" dirty="0"/>
-              <a:t>Complete Ch.6</a:t>
-            </a:r>
-          </a:p>
-        </p:txBody>
-      </p:sp>
+        </p:txBody>
+      </p:sp>
+      <p:pic>
+        <p:nvPicPr>
+          <p:cNvPr id="6" name="Picture 5">
+            <a:extLst>
+              <a:ext uri="{FF2B5EF4-FFF2-40B4-BE49-F238E27FC236}">
+                <a16:creationId xmlns:a16="http://schemas.microsoft.com/office/drawing/2014/main" id="{4F3192FC-8D0E-4CA8-BADF-63984204E5B9}"/>
+              </a:ext>
+            </a:extLst>
+          </p:cNvPr>
+          <p:cNvPicPr>
+            <a:picLocks noChangeAspect="1"/>
+          </p:cNvPicPr>
+          <p:nvPr/>
+        </p:nvPicPr>
+        <p:blipFill>
+          <a:blip r:embed="rId3"/>
+          <a:stretch>
+            <a:fillRect/>
+          </a:stretch>
+        </p:blipFill>
+        <p:spPr>
+          <a:xfrm>
+            <a:off x="1266606" y="2122191"/>
+            <a:ext cx="9658783" cy="2220500"/>
+          </a:xfrm>
+          <a:prstGeom prst="rect">
+            <a:avLst/>
+          </a:prstGeom>
+        </p:spPr>
+      </p:pic>
     </p:spTree>
     <p:extLst>
       <p:ext uri="{BB962C8B-B14F-4D97-AF65-F5344CB8AC3E}">
-        <p14:creationId xmlns:p14="http://schemas.microsoft.com/office/powerpoint/2010/main" val="3819419734"/>
+        <p14:creationId xmlns:p14="http://schemas.microsoft.com/office/powerpoint/2010/main" val="2202961636"/>
       </p:ext>
     </p:extLst>
   </p:cSld>
@@ -4774,7 +4964,7 @@
         <p:spPr>
           <a:xfrm>
             <a:off x="1524000" y="1122362"/>
-            <a:ext cx="9144000" cy="3214925"/>
+            <a:ext cx="9144000" cy="3078009"/>
           </a:xfrm>
         </p:spPr>
         <p:txBody>
@@ -4783,6 +4973,213 @@
           </a:bodyPr>
           <a:lstStyle/>
           <a:p>
+            <a:r>
+              <a:rPr lang="en-US" sz="4800" dirty="0"/>
+              <a:t>Dynamic Documents </a:t>
+            </a:r>
+            <a:br>
+              <a:rPr lang="en-US" sz="4800" dirty="0"/>
+            </a:br>
+            <a:r>
+              <a:rPr lang="en-US" sz="4800" dirty="0"/>
+              <a:t>with JavaScript</a:t>
+            </a:r>
+          </a:p>
+        </p:txBody>
+      </p:sp>
+    </p:spTree>
+    <p:extLst>
+      <p:ext uri="{BB962C8B-B14F-4D97-AF65-F5344CB8AC3E}">
+        <p14:creationId xmlns:p14="http://schemas.microsoft.com/office/powerpoint/2010/main" val="3613086193"/>
+      </p:ext>
+    </p:extLst>
+  </p:cSld>
+  <p:clrMapOvr>
+    <a:masterClrMapping/>
+  </p:clrMapOvr>
+</p:sld>
+</file>
+
+<file path=ppt/slides/slide6.xml><?xml version="1.0" encoding="utf-8"?>
+<p:sld xmlns:a="http://schemas.openxmlformats.org/drawingml/2006/main" xmlns:r="http://schemas.openxmlformats.org/officeDocument/2006/relationships" xmlns:p="http://schemas.openxmlformats.org/presentationml/2006/main">
+  <p:cSld>
+    <p:spTree>
+      <p:nvGrpSpPr>
+        <p:cNvPr id="1" name=""/>
+        <p:cNvGrpSpPr/>
+        <p:nvPr/>
+      </p:nvGrpSpPr>
+      <p:grpSpPr>
+        <a:xfrm>
+          <a:off x="0" y="0"/>
+          <a:ext cx="0" cy="0"/>
+          <a:chOff x="0" y="0"/>
+          <a:chExt cx="0" cy="0"/>
+        </a:xfrm>
+      </p:grpSpPr>
+      <p:sp>
+        <p:nvSpPr>
+          <p:cNvPr id="4" name="Title 1">
+            <a:extLst>
+              <a:ext uri="{FF2B5EF4-FFF2-40B4-BE49-F238E27FC236}">
+                <a16:creationId xmlns:a16="http://schemas.microsoft.com/office/drawing/2014/main" id="{527CE47F-3EF6-48CA-9239-E8B6E5C6B41A}"/>
+              </a:ext>
+            </a:extLst>
+          </p:cNvPr>
+          <p:cNvSpPr>
+            <a:spLocks noGrp="1"/>
+          </p:cNvSpPr>
+          <p:nvPr>
+            <p:ph type="title"/>
+          </p:nvPr>
+        </p:nvSpPr>
+        <p:spPr>
+          <a:xfrm>
+            <a:off x="838200" y="365125"/>
+            <a:ext cx="10515600" cy="1325563"/>
+          </a:xfrm>
+        </p:spPr>
+        <p:txBody>
+          <a:bodyPr>
+            <a:normAutofit/>
+          </a:bodyPr>
+          <a:lstStyle/>
+          <a:p>
+            <a:r>
+              <a:rPr lang="en-US" sz="3600" dirty="0"/>
+              <a:t>Todays Assignment</a:t>
+            </a:r>
+          </a:p>
+        </p:txBody>
+      </p:sp>
+      <p:sp>
+        <p:nvSpPr>
+          <p:cNvPr id="5" name="Content Placeholder 2">
+            <a:extLst>
+              <a:ext uri="{FF2B5EF4-FFF2-40B4-BE49-F238E27FC236}">
+                <a16:creationId xmlns:a16="http://schemas.microsoft.com/office/drawing/2014/main" id="{E8F0EA9A-219C-40FD-AE36-784EE1B77D56}"/>
+              </a:ext>
+            </a:extLst>
+          </p:cNvPr>
+          <p:cNvSpPr>
+            <a:spLocks noGrp="1"/>
+          </p:cNvSpPr>
+          <p:nvPr>
+            <p:ph idx="1"/>
+          </p:nvPr>
+        </p:nvSpPr>
+        <p:spPr>
+          <a:xfrm>
+            <a:off x="838198" y="1525772"/>
+            <a:ext cx="10515601" cy="4651191"/>
+          </a:xfrm>
+        </p:spPr>
+        <p:txBody>
+          <a:bodyPr>
+            <a:normAutofit/>
+          </a:bodyPr>
+          <a:lstStyle/>
+          <a:p>
+            <a:pPr marL="0" indent="0">
+              <a:spcBef>
+                <a:spcPts val="4800"/>
+              </a:spcBef>
+              <a:buNone/>
+            </a:pPr>
+            <a:r>
+              <a:rPr lang="en-US" sz="2000" u="sng" dirty="0"/>
+              <a:t>Assignment (before next class):</a:t>
+            </a:r>
+            <a:endParaRPr lang="en-US" sz="2000" dirty="0"/>
+          </a:p>
+          <a:p>
+            <a:r>
+              <a:rPr lang="en-US" sz="2000" dirty="0"/>
+              <a:t>Study for Midterm Exam 1 which will be Monday</a:t>
+            </a:r>
+          </a:p>
+          <a:p>
+            <a:r>
+              <a:rPr lang="en-US" sz="2000" dirty="0"/>
+              <a:t>Work on Project 3 due at the end of next week</a:t>
+            </a:r>
+          </a:p>
+          <a:p>
+            <a:r>
+              <a:rPr lang="en-US" sz="2000" dirty="0"/>
+              <a:t>Complete Ch.6</a:t>
+            </a:r>
+          </a:p>
+        </p:txBody>
+      </p:sp>
+    </p:spTree>
+    <p:extLst>
+      <p:ext uri="{BB962C8B-B14F-4D97-AF65-F5344CB8AC3E}">
+        <p14:creationId xmlns:p14="http://schemas.microsoft.com/office/powerpoint/2010/main" val="3819419734"/>
+      </p:ext>
+    </p:extLst>
+  </p:cSld>
+  <p:clrMapOvr>
+    <a:masterClrMapping/>
+  </p:clrMapOvr>
+</p:sld>
+</file>
+
+<file path=ppt/slides/slide7.xml><?xml version="1.0" encoding="utf-8"?>
+<p:sld xmlns:a="http://schemas.openxmlformats.org/drawingml/2006/main" xmlns:r="http://schemas.openxmlformats.org/officeDocument/2006/relationships" xmlns:p="http://schemas.openxmlformats.org/presentationml/2006/main">
+  <p:cSld>
+    <p:spTree>
+      <p:nvGrpSpPr>
+        <p:cNvPr id="1" name=""/>
+        <p:cNvGrpSpPr/>
+        <p:nvPr/>
+      </p:nvGrpSpPr>
+      <p:grpSpPr>
+        <a:xfrm>
+          <a:off x="0" y="0"/>
+          <a:ext cx="0" cy="0"/>
+          <a:chOff x="0" y="0"/>
+          <a:chExt cx="0" cy="0"/>
+        </a:xfrm>
+      </p:grpSpPr>
+      <p:sp>
+        <p:nvSpPr>
+          <p:cNvPr id="2" name="Title 1"/>
+          <p:cNvSpPr>
+            <a:spLocks noGrp="1"/>
+          </p:cNvSpPr>
+          <p:nvPr>
+            <p:ph type="ctrTitle"/>
+          </p:nvPr>
+        </p:nvSpPr>
+        <p:spPr>
+          <a:xfrm>
+            <a:off x="1524000" y="1122362"/>
+            <a:ext cx="9144000" cy="3933732"/>
+          </a:xfrm>
+        </p:spPr>
+        <p:txBody>
+          <a:bodyPr>
+            <a:normAutofit fontScale="90000"/>
+          </a:bodyPr>
+          <a:lstStyle/>
+          <a:p>
+            <a:br>
+              <a:rPr lang="en-US" sz="4800" dirty="0"/>
+            </a:br>
+            <a:br>
+              <a:rPr lang="en-US" sz="4800" dirty="0"/>
+            </a:br>
+            <a:r>
+              <a:rPr lang="en-US" sz="4800" dirty="0"/>
+              <a:t>If time allows…</a:t>
+            </a:r>
+            <a:br>
+              <a:rPr lang="en-US" sz="4800" dirty="0"/>
+            </a:br>
+            <a:br>
+              <a:rPr lang="en-US" sz="4800" dirty="0"/>
+            </a:br>
             <a:r>
               <a:rPr lang="en-US" sz="4800" dirty="0"/>
               <a:t>Week 7 Lab &amp; Project 3: </a:t>
@@ -4810,7 +5207,7 @@
 </p:sld>
 </file>
 
-<file path=ppt/slides/slide6.xml><?xml version="1.0" encoding="utf-8"?>
+<file path=ppt/slides/slide8.xml><?xml version="1.0" encoding="utf-8"?>
 <p:sld xmlns:a="http://schemas.openxmlformats.org/drawingml/2006/main" xmlns:r="http://schemas.openxmlformats.org/officeDocument/2006/relationships" xmlns:p="http://schemas.openxmlformats.org/presentationml/2006/main">
   <p:cSld>
     <p:bg>

</xml_diff>

<commit_message>
Update document to test sync.
</commit_message>
<xml_diff>
--- a/CPSC-24700/Presentations/session-19.pptx
+++ b/CPSC-24700/Presentations/session-19.pptx
@@ -519,6 +519,10 @@
           <a:bodyPr/>
           <a:lstStyle/>
           <a:p>
+            <a:r>
+              <a:rPr lang="en-US"/>
+              <a:t>Test sync.</a:t>
+            </a:r>
             <a:endParaRPr lang="en-US" dirty="0"/>
           </a:p>
         </p:txBody>

</xml_diff>